<commit_message>
Termino Pagina Web - Arreglo de Estetica
</commit_message>
<xml_diff>
--- a/Feria TP.pptx
+++ b/Feria TP.pptx
@@ -3166,7 +3166,7 @@
           <a:effectLst/>
           <a:extLst>
             <a:ext uri="{91240B29-F687-4f45-9708-019B960494DF}">
-              <a14:hiddenLine xmlns="" xmlns:a14="http://schemas.microsoft.com/office/drawing/2010/main" w="9525">
+              <a14:hiddenLine xmlns:a14="http://schemas.microsoft.com/office/drawing/2010/main" xmlns="" w="9525">
                 <a:solidFill>
                   <a:srgbClr val="000000"/>
                 </a:solidFill>
@@ -4676,7 +4676,7 @@
           <a:ln/>
           <a:extLst>
             <a:ext uri="{91240B29-F687-4f45-9708-019B960494DF}">
-              <a14:hiddenLine xmlns="" xmlns:a14="http://schemas.microsoft.com/office/drawing/2010/main" w="9525">
+              <a14:hiddenLine xmlns:a14="http://schemas.microsoft.com/office/drawing/2010/main" xmlns="" w="9525">
                 <a:solidFill>
                   <a:srgbClr val="000000"/>
                 </a:solidFill>
@@ -4948,7 +4948,7 @@
           <a:ln/>
           <a:extLst>
             <a:ext uri="{91240B29-F687-4f45-9708-019B960494DF}">
-              <a14:hiddenLine xmlns="" xmlns:a14="http://schemas.microsoft.com/office/drawing/2010/main" w="9525">
+              <a14:hiddenLine xmlns:a14="http://schemas.microsoft.com/office/drawing/2010/main" xmlns="" w="9525">
                 <a:solidFill>
                   <a:srgbClr val="000000"/>
                 </a:solidFill>
@@ -5228,7 +5228,7 @@
           <a:ln/>
           <a:extLst>
             <a:ext uri="{91240B29-F687-4f45-9708-019B960494DF}">
-              <a14:hiddenLine xmlns="" xmlns:a14="http://schemas.microsoft.com/office/drawing/2010/main" w="9525">
+              <a14:hiddenLine xmlns:a14="http://schemas.microsoft.com/office/drawing/2010/main" xmlns="" w="9525">
                 <a:solidFill>
                   <a:srgbClr val="000000"/>
                 </a:solidFill>
@@ -5848,7 +5848,7 @@
           <a:ln/>
           <a:extLst>
             <a:ext uri="{91240B29-F687-4f45-9708-019B960494DF}">
-              <a14:hiddenLine xmlns="" xmlns:a14="http://schemas.microsoft.com/office/drawing/2010/main" w="9525">
+              <a14:hiddenLine xmlns:a14="http://schemas.microsoft.com/office/drawing/2010/main" xmlns="" w="9525">
                 <a:solidFill>
                   <a:srgbClr val="000000"/>
                 </a:solidFill>
@@ -6184,7 +6184,7 @@
           <a:ln/>
           <a:extLst>
             <a:ext uri="{91240B29-F687-4f45-9708-019B960494DF}">
-              <a14:hiddenLine xmlns="" xmlns:a14="http://schemas.microsoft.com/office/drawing/2010/main" w="9525">
+              <a14:hiddenLine xmlns:a14="http://schemas.microsoft.com/office/drawing/2010/main" xmlns="" w="9525">
                 <a:solidFill>
                   <a:srgbClr val="000000"/>
                 </a:solidFill>
@@ -6658,7 +6658,7 @@
           <a:ln/>
           <a:extLst>
             <a:ext uri="{91240B29-F687-4f45-9708-019B960494DF}">
-              <a14:hiddenLine xmlns="" xmlns:a14="http://schemas.microsoft.com/office/drawing/2010/main" w="9525">
+              <a14:hiddenLine xmlns:a14="http://schemas.microsoft.com/office/drawing/2010/main" xmlns="" w="9525">
                 <a:solidFill>
                   <a:srgbClr val="000000"/>
                 </a:solidFill>
@@ -7081,7 +7081,7 @@
           <a:ln/>
           <a:extLst>
             <a:ext uri="{91240B29-F687-4f45-9708-019B960494DF}">
-              <a14:hiddenLine xmlns="" xmlns:a14="http://schemas.microsoft.com/office/drawing/2010/main" w="9525">
+              <a14:hiddenLine xmlns:a14="http://schemas.microsoft.com/office/drawing/2010/main" xmlns="" w="9525">
                 <a:solidFill>
                   <a:srgbClr val="000000"/>
                 </a:solidFill>
@@ -8545,10 +8545,10 @@
       </p:pic>
       <p:pic>
         <p:nvPicPr>
-          <p:cNvPr id="8" name="Marcador de contenido 7">
+          <p:cNvPr id="7" name="Marcador de contenido 6">
             <a:extLst>
               <a:ext uri="{FF2B5EF4-FFF2-40B4-BE49-F238E27FC236}">
-                <a16:creationId xmlns:a16="http://schemas.microsoft.com/office/drawing/2014/main" id="{2714CB58-3B9F-3C8E-5A81-BE7957D4D42D}"/>
+                <a16:creationId xmlns:a16="http://schemas.microsoft.com/office/drawing/2014/main" id="{1412F641-A1ED-F3EE-154D-EDE05CDCB07D}"/>
               </a:ext>
             </a:extLst>
           </p:cNvPr>
@@ -8567,8 +8567,8 @@
         </p:blipFill>
         <p:spPr>
           <a:xfrm>
-            <a:off x="5899354" y="2989607"/>
-            <a:ext cx="6088502" cy="2781728"/>
+            <a:off x="5665240" y="3023528"/>
+            <a:ext cx="6390284" cy="2713886"/>
           </a:xfrm>
         </p:spPr>
       </p:pic>
@@ -8801,8 +8801,8 @@
         </p:blipFill>
         <p:spPr>
           <a:xfrm>
-            <a:off x="6095999" y="2470022"/>
-            <a:ext cx="5424358" cy="1917956"/>
+            <a:off x="5675972" y="2010876"/>
+            <a:ext cx="6264412" cy="2214984"/>
           </a:xfrm>
         </p:spPr>
       </p:pic>
@@ -8828,8 +8828,8 @@
         </p:blipFill>
         <p:spPr>
           <a:xfrm>
-            <a:off x="6095999" y="4350908"/>
-            <a:ext cx="5424358" cy="2100208"/>
+            <a:off x="5675973" y="4188282"/>
+            <a:ext cx="6264410" cy="2425460"/>
           </a:xfrm>
           <a:prstGeom prst="rect">
             <a:avLst/>
@@ -8890,7 +8890,7 @@
             <a:pPr algn="ctr"/>
             <a:r>
               <a:rPr lang="es-CL" dirty="0"/>
-              <a:t>Videos de la pagina</a:t>
+              <a:t>Videos de la Pagina</a:t>
             </a:r>
           </a:p>
         </p:txBody>
@@ -8926,19 +8926,17 @@
       </p:pic>
       <p:pic>
         <p:nvPicPr>
-          <p:cNvPr id="8" name="Marcador de contenido 7">
+          <p:cNvPr id="9" name="Marcador de contenido 6">
             <a:extLst>
               <a:ext uri="{FF2B5EF4-FFF2-40B4-BE49-F238E27FC236}">
-                <a16:creationId xmlns:a16="http://schemas.microsoft.com/office/drawing/2014/main" id="{A2FA1F08-FE4A-B22F-024E-0588045115B4}"/>
+                <a16:creationId xmlns:a16="http://schemas.microsoft.com/office/drawing/2014/main" id="{0002190E-3246-5917-3E89-E9F803FEA433}"/>
               </a:ext>
             </a:extLst>
           </p:cNvPr>
           <p:cNvPicPr>
-            <a:picLocks noGrp="1" noChangeAspect="1"/>
+            <a:picLocks noChangeAspect="1"/>
           </p:cNvPicPr>
-          <p:nvPr>
-            <p:ph sz="half" idx="2"/>
-          </p:nvPr>
+          <p:nvPr/>
         </p:nvPicPr>
         <p:blipFill>
           <a:blip r:embed="rId3"/>
@@ -8948,9 +8946,19 @@
         </p:blipFill>
         <p:spPr>
           <a:xfrm>
-            <a:off x="5976637" y="1890584"/>
-            <a:ext cx="5597525" cy="4967416"/>
+            <a:off x="5267441" y="2749312"/>
+            <a:ext cx="6739289" cy="3263179"/>
           </a:xfrm>
+          <a:prstGeom prst="rect">
+            <a:avLst/>
+          </a:prstGeom>
+          <a:effectLst>
+            <a:outerShdw blurRad="50800" dir="14400000">
+              <a:srgbClr val="000000">
+                <a:alpha val="40000"/>
+              </a:srgbClr>
+            </a:outerShdw>
+          </a:effectLst>
         </p:spPr>
       </p:pic>
     </p:spTree>
@@ -9007,7 +9015,7 @@
             <a:pPr algn="ctr"/>
             <a:r>
               <a:rPr lang="es-CL" dirty="0"/>
-              <a:t>Contacto de la pagina</a:t>
+              <a:t>Contacto de la Pagina</a:t>
             </a:r>
           </a:p>
         </p:txBody>

</xml_diff>